<commit_message>
Ok, CTRL-S does not work on PowerPoint or Word...
</commit_message>
<xml_diff>
--- a/docs/Checkpoint III - Presentation.pptx
+++ b/docs/Checkpoint III - Presentation.pptx
@@ -4108,7 +4108,12 @@
             <p:ph idx="1"/>
           </p:nvPr>
         </p:nvSpPr>
-        <p:spPr/>
+        <p:spPr>
+          <a:xfrm>
+            <a:off x="457200" y="1285860"/>
+            <a:ext cx="2674640" cy="1423060"/>
+          </a:xfrm>
+        </p:spPr>
         <p:txBody>
           <a:bodyPr>
             <a:noAutofit/>
@@ -4117,7 +4122,7 @@
           <a:p>
             <a:r>
               <a:rPr lang="en-US" sz="2400" i="1" dirty="0"/>
-              <a:t>Choropleth Map:		               Dynamic Heat Map</a:t>
+              <a:t>Choropleth Map:</a:t>
             </a:r>
           </a:p>
           <a:p>
@@ -4129,6 +4134,189 @@
               <a:rPr lang="en-US" sz="2000" i="1" dirty="0"/>
               <a:t>Scatter plot;</a:t>
             </a:r>
+          </a:p>
+          <a:p>
+            <a:pPr marL="971550" lvl="1" indent="-571500">
+              <a:buFont typeface="Wingdings" panose="05000000000000000000" pitchFamily="2" charset="2"/>
+              <a:buChar char="Ø"/>
+            </a:pPr>
+            <a:r>
+              <a:rPr lang="en-US" sz="2000" i="1" dirty="0"/>
+              <a:t>Bar chart;</a:t>
+            </a:r>
+          </a:p>
+        </p:txBody>
+      </p:sp>
+      <p:sp>
+        <p:nvSpPr>
+          <p:cNvPr id="4" name="Content Placeholder 2">
+            <a:extLst>
+              <a:ext uri="{FF2B5EF4-FFF2-40B4-BE49-F238E27FC236}">
+                <a16:creationId xmlns:a16="http://schemas.microsoft.com/office/drawing/2014/main" id="{C712FBBF-3216-4DDA-B0CC-4ADB4A95EF26}"/>
+              </a:ext>
+            </a:extLst>
+          </p:cNvPr>
+          <p:cNvSpPr txBox="1">
+            <a:spLocks/>
+          </p:cNvSpPr>
+          <p:nvPr/>
+        </p:nvSpPr>
+        <p:spPr>
+          <a:xfrm>
+            <a:off x="5508104" y="1285860"/>
+            <a:ext cx="2880320" cy="1063020"/>
+          </a:xfrm>
+          <a:prstGeom prst="rect">
+            <a:avLst/>
+          </a:prstGeom>
+        </p:spPr>
+        <p:txBody>
+          <a:bodyPr vert="horz" lIns="91440" tIns="45720" rIns="91440" bIns="45720" rtlCol="0">
+            <a:noAutofit/>
+          </a:bodyPr>
+          <a:lstStyle>
+            <a:lvl1pPr marL="342900" indent="-342900" algn="l" defTabSz="914400" rtl="0" eaLnBrk="1" latinLnBrk="0" hangingPunct="1">
+              <a:spcBef>
+                <a:spcPts val="1800"/>
+              </a:spcBef>
+              <a:buFont typeface="Arial" pitchFamily="34" charset="0"/>
+              <a:buNone/>
+              <a:defRPr sz="3200" b="1" kern="1200">
+                <a:solidFill>
+                  <a:srgbClr val="336699"/>
+                </a:solidFill>
+                <a:latin typeface="+mn-lt"/>
+                <a:ea typeface="+mn-ea"/>
+                <a:cs typeface="+mn-cs"/>
+              </a:defRPr>
+            </a:lvl1pPr>
+            <a:lvl2pPr marL="742950" indent="-285750" algn="l" defTabSz="914400" rtl="0" eaLnBrk="1" latinLnBrk="0" hangingPunct="1">
+              <a:spcBef>
+                <a:spcPts val="600"/>
+              </a:spcBef>
+              <a:buFont typeface="Arial" pitchFamily="34" charset="0"/>
+              <a:buNone/>
+              <a:defRPr sz="2800" kern="1200">
+                <a:solidFill>
+                  <a:schemeClr val="tx1"/>
+                </a:solidFill>
+                <a:latin typeface="+mn-lt"/>
+                <a:ea typeface="+mn-ea"/>
+                <a:cs typeface="+mn-cs"/>
+              </a:defRPr>
+            </a:lvl2pPr>
+            <a:lvl3pPr marL="1143000" indent="-228600" algn="l" defTabSz="914400" rtl="0" eaLnBrk="1" latinLnBrk="0" hangingPunct="1">
+              <a:spcBef>
+                <a:spcPts val="0"/>
+              </a:spcBef>
+              <a:buFont typeface="Arial" pitchFamily="34" charset="0"/>
+              <a:buNone/>
+              <a:defRPr sz="2400" kern="1200">
+                <a:solidFill>
+                  <a:schemeClr val="tx1"/>
+                </a:solidFill>
+                <a:latin typeface="+mn-lt"/>
+                <a:ea typeface="+mn-ea"/>
+                <a:cs typeface="+mn-cs"/>
+              </a:defRPr>
+            </a:lvl3pPr>
+            <a:lvl4pPr marL="1600200" indent="-228600" algn="l" defTabSz="914400" rtl="0" eaLnBrk="1" latinLnBrk="0" hangingPunct="1">
+              <a:spcBef>
+                <a:spcPts val="0"/>
+              </a:spcBef>
+              <a:buFont typeface="Arial" pitchFamily="34" charset="0"/>
+              <a:buNone/>
+              <a:defRPr sz="2000" kern="1200">
+                <a:solidFill>
+                  <a:schemeClr val="tx1"/>
+                </a:solidFill>
+                <a:latin typeface="+mn-lt"/>
+                <a:ea typeface="+mn-ea"/>
+                <a:cs typeface="+mn-cs"/>
+              </a:defRPr>
+            </a:lvl4pPr>
+            <a:lvl5pPr marL="2057400" indent="-228600" algn="l" defTabSz="914400" rtl="0" eaLnBrk="1" latinLnBrk="0" hangingPunct="1">
+              <a:spcBef>
+                <a:spcPts val="0"/>
+              </a:spcBef>
+              <a:buFont typeface="Arial" pitchFamily="34" charset="0"/>
+              <a:buNone/>
+              <a:defRPr sz="2000" kern="1200">
+                <a:solidFill>
+                  <a:schemeClr val="tx1"/>
+                </a:solidFill>
+                <a:latin typeface="+mn-lt"/>
+                <a:ea typeface="+mn-ea"/>
+                <a:cs typeface="+mn-cs"/>
+              </a:defRPr>
+            </a:lvl5pPr>
+            <a:lvl6pPr marL="2514600" indent="-228600" algn="l" defTabSz="914400" rtl="0" eaLnBrk="1" latinLnBrk="0" hangingPunct="1">
+              <a:spcBef>
+                <a:spcPct val="20000"/>
+              </a:spcBef>
+              <a:buFont typeface="Arial" pitchFamily="34" charset="0"/>
+              <a:buChar char="•"/>
+              <a:defRPr sz="2000" kern="1200">
+                <a:solidFill>
+                  <a:schemeClr val="tx1"/>
+                </a:solidFill>
+                <a:latin typeface="+mn-lt"/>
+                <a:ea typeface="+mn-ea"/>
+                <a:cs typeface="+mn-cs"/>
+              </a:defRPr>
+            </a:lvl6pPr>
+            <a:lvl7pPr marL="2971800" indent="-228600" algn="l" defTabSz="914400" rtl="0" eaLnBrk="1" latinLnBrk="0" hangingPunct="1">
+              <a:spcBef>
+                <a:spcPct val="20000"/>
+              </a:spcBef>
+              <a:buFont typeface="Arial" pitchFamily="34" charset="0"/>
+              <a:buChar char="•"/>
+              <a:defRPr sz="2000" kern="1200">
+                <a:solidFill>
+                  <a:schemeClr val="tx1"/>
+                </a:solidFill>
+                <a:latin typeface="+mn-lt"/>
+                <a:ea typeface="+mn-ea"/>
+                <a:cs typeface="+mn-cs"/>
+              </a:defRPr>
+            </a:lvl7pPr>
+            <a:lvl8pPr marL="3429000" indent="-228600" algn="l" defTabSz="914400" rtl="0" eaLnBrk="1" latinLnBrk="0" hangingPunct="1">
+              <a:spcBef>
+                <a:spcPct val="20000"/>
+              </a:spcBef>
+              <a:buFont typeface="Arial" pitchFamily="34" charset="0"/>
+              <a:buChar char="•"/>
+              <a:defRPr sz="2000" kern="1200">
+                <a:solidFill>
+                  <a:schemeClr val="tx1"/>
+                </a:solidFill>
+                <a:latin typeface="+mn-lt"/>
+                <a:ea typeface="+mn-ea"/>
+                <a:cs typeface="+mn-cs"/>
+              </a:defRPr>
+            </a:lvl8pPr>
+            <a:lvl9pPr marL="3886200" indent="-228600" algn="l" defTabSz="914400" rtl="0" eaLnBrk="1" latinLnBrk="0" hangingPunct="1">
+              <a:spcBef>
+                <a:spcPct val="20000"/>
+              </a:spcBef>
+              <a:buFont typeface="Arial" pitchFamily="34" charset="0"/>
+              <a:buChar char="•"/>
+              <a:defRPr sz="2000" kern="1200">
+                <a:solidFill>
+                  <a:schemeClr val="tx1"/>
+                </a:solidFill>
+                <a:latin typeface="+mn-lt"/>
+                <a:ea typeface="+mn-ea"/>
+                <a:cs typeface="+mn-cs"/>
+              </a:defRPr>
+            </a:lvl9pPr>
+          </a:lstStyle>
+          <a:p>
+            <a:r>
+              <a:rPr lang="en-US" sz="2400" i="1" dirty="0"/>
+              <a:t>Dynamic Heat Map:</a:t>
+            </a:r>
+            <a:endParaRPr lang="en-US" sz="2000" i="1" dirty="0"/>
           </a:p>
           <a:p>
             <a:pPr marL="971550" lvl="1" indent="-571500">
@@ -4930,7 +5118,7 @@
         <p:spPr>
           <a:xfrm>
             <a:off x="5214641" y="3825914"/>
-            <a:ext cx="2386608" cy="646331"/>
+            <a:ext cx="2386608" cy="923330"/>
           </a:xfrm>
           <a:prstGeom prst="rect">
             <a:avLst/>
@@ -4945,7 +5133,7 @@
           <a:p>
             <a:r>
               <a:rPr lang="en-US" dirty="0"/>
-              <a:t>Height indicates players’ earnings</a:t>
+              <a:t>Height indicates earnings or quantity of tournaments</a:t>
             </a:r>
           </a:p>
         </p:txBody>

</xml_diff>

<commit_message>
Put names and group numbers in presentation.
</commit_message>
<xml_diff>
--- a/docs/Checkpoint III - Presentation.pptx
+++ b/docs/Checkpoint III - Presentation.pptx
@@ -287,7 +287,7 @@
           <a:p>
             <a:fld id="{C7B702CB-D988-47C5-8204-95032A6A7C26}" type="slidenum">
               <a:rPr lang="en-US" smtClean="0"/>
-              <a:t>‹nº›</a:t>
+              <a:t>‹#›</a:t>
             </a:fld>
             <a:endParaRPr lang="en-US"/>
           </a:p>
@@ -548,7 +548,7 @@
             <a:fld id="{F535F173-C1DD-4975-94BF-5B9ED67F7674}" type="slidenum">
               <a:rPr lang="en-US" smtClean="0"/>
               <a:pPr/>
-              <a:t>‹nº›</a:t>
+              <a:t>‹#›</a:t>
             </a:fld>
             <a:endParaRPr lang="en-US"/>
           </a:p>
@@ -1803,7 +1803,7 @@
             <a:fld id="{B5EBF8D4-C87A-47B7-9996-84452461937B}" type="slidenum">
               <a:rPr lang="pt-PT" smtClean="0"/>
               <a:pPr/>
-              <a:t>‹nº›</a:t>
+              <a:t>‹#›</a:t>
             </a:fld>
             <a:endParaRPr lang="pt-PT"/>
           </a:p>
@@ -3521,7 +3521,7 @@
                   <a:schemeClr val="bg2"/>
                 </a:solidFill>
               </a:rPr>
-              <a:t>GX-A/T</a:t>
+              <a:t>G13-A</a:t>
             </a:r>
           </a:p>
         </p:txBody>
@@ -3536,8 +3536,8 @@
         </p:nvSpPr>
         <p:spPr>
           <a:xfrm>
-            <a:off x="1979712" y="4571984"/>
-            <a:ext cx="2285984" cy="2286016"/>
+            <a:off x="1979712" y="4365104"/>
+            <a:ext cx="2664296" cy="2492896"/>
           </a:xfrm>
           <a:prstGeom prst="rect">
             <a:avLst/>
@@ -3692,96 +3692,33 @@
           </a:lstStyle>
           <a:p>
             <a:r>
-              <a:rPr lang="pt-PT" sz="2400" b="0" dirty="0" err="1">
-                <a:solidFill>
-                  <a:schemeClr val="bg2"/>
-                </a:solidFill>
-              </a:rPr>
-              <a:t>Number</a:t>
-            </a:r>
-            <a:r>
               <a:rPr lang="pt-PT" sz="2400" b="0" dirty="0">
                 <a:solidFill>
                   <a:schemeClr val="bg2"/>
                 </a:solidFill>
               </a:rPr>
-              <a:t> – </a:t>
-            </a:r>
-            <a:r>
-              <a:rPr lang="pt-PT" sz="2400" b="0" dirty="0" err="1">
-                <a:solidFill>
-                  <a:schemeClr val="bg2"/>
-                </a:solidFill>
-              </a:rPr>
-              <a:t>Name</a:t>
-            </a:r>
-            <a:endParaRPr lang="pt-PT" sz="2400" b="0" dirty="0">
-              <a:solidFill>
-                <a:schemeClr val="bg2"/>
-              </a:solidFill>
-            </a:endParaRPr>
-          </a:p>
-          <a:p>
-            <a:r>
-              <a:rPr lang="pt-PT" sz="2400" b="0" dirty="0" err="1">
-                <a:solidFill>
-                  <a:schemeClr val="bg2"/>
-                </a:solidFill>
-              </a:rPr>
-              <a:t>Number</a:t>
-            </a:r>
+              <a:t>83463 – Francisco Campaniço</a:t>
+            </a:r>
+          </a:p>
+          <a:p>
             <a:r>
               <a:rPr lang="pt-PT" sz="2400" b="0" dirty="0">
                 <a:solidFill>
                   <a:schemeClr val="bg2"/>
                 </a:solidFill>
               </a:rPr>
-              <a:t> – </a:t>
-            </a:r>
-            <a:r>
-              <a:rPr lang="pt-PT" sz="2400" b="0" dirty="0" err="1">
-                <a:solidFill>
-                  <a:schemeClr val="bg2"/>
-                </a:solidFill>
-              </a:rPr>
-              <a:t>Name</a:t>
-            </a:r>
-            <a:endParaRPr lang="pt-PT" sz="2400" b="0" dirty="0">
-              <a:solidFill>
-                <a:schemeClr val="bg2"/>
-              </a:solidFill>
-            </a:endParaRPr>
-          </a:p>
-          <a:p>
-            <a:r>
-              <a:rPr lang="pt-PT" sz="2400" b="0" dirty="0" err="1">
-                <a:solidFill>
-                  <a:schemeClr val="bg2"/>
-                </a:solidFill>
-              </a:rPr>
-              <a:t>Number</a:t>
-            </a:r>
+              <a:t>83482 – João Rafael</a:t>
+            </a:r>
+          </a:p>
+          <a:p>
             <a:r>
               <a:rPr lang="pt-PT" sz="2400" b="0" dirty="0">
                 <a:solidFill>
                   <a:schemeClr val="bg2"/>
                 </a:solidFill>
               </a:rPr>
-              <a:t> – </a:t>
-            </a:r>
-            <a:r>
-              <a:rPr lang="pt-PT" sz="2400" b="0" dirty="0" err="1">
-                <a:solidFill>
-                  <a:schemeClr val="bg2"/>
-                </a:solidFill>
-              </a:rPr>
-              <a:t>Name</a:t>
-            </a:r>
-            <a:endParaRPr lang="pt-PT" sz="2400" b="0" dirty="0">
-              <a:solidFill>
-                <a:schemeClr val="bg2"/>
-              </a:solidFill>
-            </a:endParaRPr>
+              <a:t>83558 – Rodrigo Oliveira</a:t>
+            </a:r>
           </a:p>
         </p:txBody>
       </p:sp>

</xml_diff>

<commit_message>
Final report and presentation? - Needs reviewing
</commit_message>
<xml_diff>
--- a/docs/Checkpoint III - Presentation.pptx
+++ b/docs/Checkpoint III - Presentation.pptx
@@ -5,10 +5,10 @@
     <p:sldMasterId id="2147483648" r:id="rId1"/>
   </p:sldMasterIdLst>
   <p:notesMasterIdLst>
-    <p:notesMasterId r:id="rId13"/>
+    <p:notesMasterId r:id="rId15"/>
   </p:notesMasterIdLst>
   <p:handoutMasterIdLst>
-    <p:handoutMasterId r:id="rId14"/>
+    <p:handoutMasterId r:id="rId16"/>
   </p:handoutMasterIdLst>
   <p:sldIdLst>
     <p:sldId id="256" r:id="rId2"/>
@@ -21,7 +21,9 @@
     <p:sldId id="1114" r:id="rId9"/>
     <p:sldId id="1097" r:id="rId10"/>
     <p:sldId id="1098" r:id="rId11"/>
-    <p:sldId id="1110" r:id="rId12"/>
+    <p:sldId id="1115" r:id="rId12"/>
+    <p:sldId id="1110" r:id="rId13"/>
+    <p:sldId id="1116" r:id="rId14"/>
   </p:sldIdLst>
   <p:sldSz cx="9144000" cy="6858000" type="screen4x3"/>
   <p:notesSz cx="6858000" cy="9144000"/>
@@ -287,7 +289,7 @@
           <a:p>
             <a:fld id="{C7B702CB-D988-47C5-8204-95032A6A7C26}" type="slidenum">
               <a:rPr lang="en-US" smtClean="0"/>
-              <a:t>‹#›</a:t>
+              <a:t>‹nº›</a:t>
             </a:fld>
             <a:endParaRPr lang="en-US"/>
           </a:p>
@@ -548,7 +550,7 @@
             <a:fld id="{F535F173-C1DD-4975-94BF-5B9ED67F7674}" type="slidenum">
               <a:rPr lang="en-US" smtClean="0"/>
               <a:pPr/>
-              <a:t>‹#›</a:t>
+              <a:t>‹nº›</a:t>
             </a:fld>
             <a:endParaRPr lang="en-US"/>
           </a:p>
@@ -1242,7 +1244,177 @@
     </p:spTree>
     <p:extLst>
       <p:ext uri="{BB962C8B-B14F-4D97-AF65-F5344CB8AC3E}">
+        <p14:creationId xmlns:p14="http://schemas.microsoft.com/office/powerpoint/2010/main" val="4210272104"/>
+      </p:ext>
+    </p:extLst>
+  </p:cSld>
+  <p:clrMapOvr>
+    <a:masterClrMapping/>
+  </p:clrMapOvr>
+</p:notes>
+</file>
+
+<file path=ppt/notesSlides/notesSlide8.xml><?xml version="1.0" encoding="utf-8"?>
+<p:notes xmlns:a="http://schemas.openxmlformats.org/drawingml/2006/main" xmlns:r="http://schemas.openxmlformats.org/officeDocument/2006/relationships" xmlns:p="http://schemas.openxmlformats.org/presentationml/2006/main">
+  <p:cSld>
+    <p:spTree>
+      <p:nvGrpSpPr>
+        <p:cNvPr id="1" name=""/>
+        <p:cNvGrpSpPr/>
+        <p:nvPr/>
+      </p:nvGrpSpPr>
+      <p:grpSpPr>
+        <a:xfrm>
+          <a:off x="0" y="0"/>
+          <a:ext cx="0" cy="0"/>
+          <a:chOff x="0" y="0"/>
+          <a:chExt cx="0" cy="0"/>
+        </a:xfrm>
+      </p:grpSpPr>
+      <p:sp>
+        <p:nvSpPr>
+          <p:cNvPr id="2" name="Slide Image Placeholder 1"/>
+          <p:cNvSpPr>
+            <a:spLocks noGrp="1" noRot="1" noChangeAspect="1"/>
+          </p:cNvSpPr>
+          <p:nvPr>
+            <p:ph type="sldImg"/>
+          </p:nvPr>
+        </p:nvSpPr>
+        <p:spPr/>
+      </p:sp>
+      <p:sp>
+        <p:nvSpPr>
+          <p:cNvPr id="3" name="Notes Placeholder 2"/>
+          <p:cNvSpPr>
+            <a:spLocks noGrp="1"/>
+          </p:cNvSpPr>
+          <p:nvPr>
+            <p:ph type="body" idx="1"/>
+          </p:nvPr>
+        </p:nvSpPr>
+        <p:spPr/>
+        <p:txBody>
+          <a:bodyPr/>
+          <a:lstStyle/>
+          <a:p>
+            <a:endParaRPr lang="en-US" baseline="0" dirty="0"/>
+          </a:p>
+        </p:txBody>
+      </p:sp>
+      <p:sp>
+        <p:nvSpPr>
+          <p:cNvPr id="4" name="Slide Number Placeholder 3"/>
+          <p:cNvSpPr>
+            <a:spLocks noGrp="1"/>
+          </p:cNvSpPr>
+          <p:nvPr>
+            <p:ph type="sldNum" sz="quarter" idx="10"/>
+          </p:nvPr>
+        </p:nvSpPr>
+        <p:spPr/>
+        <p:txBody>
+          <a:bodyPr/>
+          <a:lstStyle/>
+          <a:p>
+            <a:fld id="{F535F173-C1DD-4975-94BF-5B9ED67F7674}" type="slidenum">
+              <a:rPr lang="en-US" smtClean="0"/>
+              <a:pPr/>
+              <a:t>12</a:t>
+            </a:fld>
+            <a:endParaRPr lang="en-US"/>
+          </a:p>
+        </p:txBody>
+      </p:sp>
+    </p:spTree>
+    <p:extLst>
+      <p:ext uri="{BB962C8B-B14F-4D97-AF65-F5344CB8AC3E}">
         <p14:creationId xmlns:p14="http://schemas.microsoft.com/office/powerpoint/2010/main" val="1355792998"/>
+      </p:ext>
+    </p:extLst>
+  </p:cSld>
+  <p:clrMapOvr>
+    <a:masterClrMapping/>
+  </p:clrMapOvr>
+</p:notes>
+</file>
+
+<file path=ppt/notesSlides/notesSlide9.xml><?xml version="1.0" encoding="utf-8"?>
+<p:notes xmlns:a="http://schemas.openxmlformats.org/drawingml/2006/main" xmlns:r="http://schemas.openxmlformats.org/officeDocument/2006/relationships" xmlns:p="http://schemas.openxmlformats.org/presentationml/2006/main">
+  <p:cSld>
+    <p:spTree>
+      <p:nvGrpSpPr>
+        <p:cNvPr id="1" name=""/>
+        <p:cNvGrpSpPr/>
+        <p:nvPr/>
+      </p:nvGrpSpPr>
+      <p:grpSpPr>
+        <a:xfrm>
+          <a:off x="0" y="0"/>
+          <a:ext cx="0" cy="0"/>
+          <a:chOff x="0" y="0"/>
+          <a:chExt cx="0" cy="0"/>
+        </a:xfrm>
+      </p:grpSpPr>
+      <p:sp>
+        <p:nvSpPr>
+          <p:cNvPr id="2" name="Slide Image Placeholder 1"/>
+          <p:cNvSpPr>
+            <a:spLocks noGrp="1" noRot="1" noChangeAspect="1"/>
+          </p:cNvSpPr>
+          <p:nvPr>
+            <p:ph type="sldImg"/>
+          </p:nvPr>
+        </p:nvSpPr>
+        <p:spPr/>
+      </p:sp>
+      <p:sp>
+        <p:nvSpPr>
+          <p:cNvPr id="3" name="Notes Placeholder 2"/>
+          <p:cNvSpPr>
+            <a:spLocks noGrp="1"/>
+          </p:cNvSpPr>
+          <p:nvPr>
+            <p:ph type="body" idx="1"/>
+          </p:nvPr>
+        </p:nvSpPr>
+        <p:spPr/>
+        <p:txBody>
+          <a:bodyPr/>
+          <a:lstStyle/>
+          <a:p>
+            <a:endParaRPr lang="en-US" baseline="0" dirty="0"/>
+          </a:p>
+        </p:txBody>
+      </p:sp>
+      <p:sp>
+        <p:nvSpPr>
+          <p:cNvPr id="4" name="Slide Number Placeholder 3"/>
+          <p:cNvSpPr>
+            <a:spLocks noGrp="1"/>
+          </p:cNvSpPr>
+          <p:nvPr>
+            <p:ph type="sldNum" sz="quarter" idx="10"/>
+          </p:nvPr>
+        </p:nvSpPr>
+        <p:spPr/>
+        <p:txBody>
+          <a:bodyPr/>
+          <a:lstStyle/>
+          <a:p>
+            <a:fld id="{F535F173-C1DD-4975-94BF-5B9ED67F7674}" type="slidenum">
+              <a:rPr lang="en-US" smtClean="0"/>
+              <a:pPr/>
+              <a:t>13</a:t>
+            </a:fld>
+            <a:endParaRPr lang="en-US"/>
+          </a:p>
+        </p:txBody>
+      </p:sp>
+    </p:spTree>
+    <p:extLst>
+      <p:ext uri="{BB962C8B-B14F-4D97-AF65-F5344CB8AC3E}">
+        <p14:creationId xmlns:p14="http://schemas.microsoft.com/office/powerpoint/2010/main" val="2891259000"/>
       </p:ext>
     </p:extLst>
   </p:cSld>
@@ -1803,7 +1975,7 @@
             <a:fld id="{B5EBF8D4-C87A-47B7-9996-84452461937B}" type="slidenum">
               <a:rPr lang="pt-PT" smtClean="0"/>
               <a:pPr/>
-              <a:t>‹#›</a:t>
+              <a:t>‹nº›</a:t>
             </a:fld>
             <a:endParaRPr lang="pt-PT"/>
           </a:p>
@@ -3521,7 +3693,7 @@
                   <a:schemeClr val="bg2"/>
                 </a:solidFill>
               </a:rPr>
-              <a:t>G13-A</a:t>
+              <a:t>GX-A/T</a:t>
             </a:r>
           </a:p>
         </p:txBody>
@@ -3536,8 +3708,8 @@
         </p:nvSpPr>
         <p:spPr>
           <a:xfrm>
-            <a:off x="1979712" y="4365104"/>
-            <a:ext cx="2664296" cy="2492896"/>
+            <a:off x="1979712" y="4571984"/>
+            <a:ext cx="2285984" cy="2286016"/>
           </a:xfrm>
           <a:prstGeom prst="rect">
             <a:avLst/>
@@ -3692,33 +3864,96 @@
           </a:lstStyle>
           <a:p>
             <a:r>
+              <a:rPr lang="pt-PT" sz="2400" b="0" dirty="0" err="1">
+                <a:solidFill>
+                  <a:schemeClr val="bg2"/>
+                </a:solidFill>
+              </a:rPr>
+              <a:t>Number</a:t>
+            </a:r>
+            <a:r>
               <a:rPr lang="pt-PT" sz="2400" b="0" dirty="0">
                 <a:solidFill>
                   <a:schemeClr val="bg2"/>
                 </a:solidFill>
               </a:rPr>
-              <a:t>83463 – Francisco Campaniço</a:t>
-            </a:r>
-          </a:p>
-          <a:p>
+              <a:t> – </a:t>
+            </a:r>
+            <a:r>
+              <a:rPr lang="pt-PT" sz="2400" b="0" dirty="0" err="1">
+                <a:solidFill>
+                  <a:schemeClr val="bg2"/>
+                </a:solidFill>
+              </a:rPr>
+              <a:t>Name</a:t>
+            </a:r>
+            <a:endParaRPr lang="pt-PT" sz="2400" b="0" dirty="0">
+              <a:solidFill>
+                <a:schemeClr val="bg2"/>
+              </a:solidFill>
+            </a:endParaRPr>
+          </a:p>
+          <a:p>
+            <a:r>
+              <a:rPr lang="pt-PT" sz="2400" b="0" dirty="0" err="1">
+                <a:solidFill>
+                  <a:schemeClr val="bg2"/>
+                </a:solidFill>
+              </a:rPr>
+              <a:t>Number</a:t>
+            </a:r>
             <a:r>
               <a:rPr lang="pt-PT" sz="2400" b="0" dirty="0">
                 <a:solidFill>
                   <a:schemeClr val="bg2"/>
                 </a:solidFill>
               </a:rPr>
-              <a:t>83482 – João Rafael</a:t>
-            </a:r>
-          </a:p>
-          <a:p>
+              <a:t> – </a:t>
+            </a:r>
+            <a:r>
+              <a:rPr lang="pt-PT" sz="2400" b="0" dirty="0" err="1">
+                <a:solidFill>
+                  <a:schemeClr val="bg2"/>
+                </a:solidFill>
+              </a:rPr>
+              <a:t>Name</a:t>
+            </a:r>
+            <a:endParaRPr lang="pt-PT" sz="2400" b="0" dirty="0">
+              <a:solidFill>
+                <a:schemeClr val="bg2"/>
+              </a:solidFill>
+            </a:endParaRPr>
+          </a:p>
+          <a:p>
+            <a:r>
+              <a:rPr lang="pt-PT" sz="2400" b="0" dirty="0" err="1">
+                <a:solidFill>
+                  <a:schemeClr val="bg2"/>
+                </a:solidFill>
+              </a:rPr>
+              <a:t>Number</a:t>
+            </a:r>
             <a:r>
               <a:rPr lang="pt-PT" sz="2400" b="0" dirty="0">
                 <a:solidFill>
                   <a:schemeClr val="bg2"/>
                 </a:solidFill>
               </a:rPr>
-              <a:t>83558 – Rodrigo Oliveira</a:t>
-            </a:r>
+              <a:t> – </a:t>
+            </a:r>
+            <a:r>
+              <a:rPr lang="pt-PT" sz="2400" b="0" dirty="0" err="1">
+                <a:solidFill>
+                  <a:schemeClr val="bg2"/>
+                </a:solidFill>
+              </a:rPr>
+              <a:t>Name</a:t>
+            </a:r>
+            <a:endParaRPr lang="pt-PT" sz="2400" b="0" dirty="0">
+              <a:solidFill>
+                <a:schemeClr val="bg2"/>
+              </a:solidFill>
+            </a:endParaRPr>
           </a:p>
         </p:txBody>
       </p:sp>
@@ -3764,7 +3999,7 @@
           <a:p>
             <a:r>
               <a:rPr lang="en-US" dirty="0"/>
-              <a:t>Task 1</a:t>
+              <a:t>Choropleth Map</a:t>
             </a:r>
             <a:endParaRPr lang="pt-PT" dirty="0"/>
           </a:p>
@@ -3780,24 +4015,62 @@
             <p:ph idx="1"/>
           </p:nvPr>
         </p:nvSpPr>
-        <p:spPr/>
+        <p:spPr>
+          <a:xfrm>
+            <a:off x="457200" y="1285860"/>
+            <a:ext cx="8229600" cy="702980"/>
+          </a:xfrm>
+        </p:spPr>
         <p:txBody>
           <a:bodyPr>
             <a:noAutofit/>
           </a:bodyPr>
           <a:lstStyle/>
           <a:p>
-            <a:r>
-              <a:rPr lang="en-US" dirty="0"/>
-              <a:t>Selected Idiom and why it allows answering each question</a:t>
-            </a:r>
-          </a:p>
-          <a:p>
-            <a:pPr lvl="1"/>
-            <a:endParaRPr lang="en-US" sz="2000" dirty="0"/>
-          </a:p>
-        </p:txBody>
-      </p:sp>
+            <a:pPr lvl="0"/>
+            <a:r>
+              <a:rPr lang="en-GB" dirty="0"/>
+              <a:t>What countries have the highest earnings?</a:t>
+            </a:r>
+            <a:endParaRPr lang="en-US" dirty="0"/>
+          </a:p>
+        </p:txBody>
+      </p:sp>
+      <p:pic>
+        <p:nvPicPr>
+          <p:cNvPr id="4" name="Imagem 3">
+            <a:extLst>
+              <a:ext uri="{FF2B5EF4-FFF2-40B4-BE49-F238E27FC236}">
+                <a16:creationId xmlns:a16="http://schemas.microsoft.com/office/drawing/2014/main" id="{B25D6205-4D8D-4A40-AE14-8606A47F252B}"/>
+              </a:ext>
+            </a:extLst>
+          </p:cNvPr>
+          <p:cNvPicPr/>
+          <p:nvPr/>
+        </p:nvPicPr>
+        <p:blipFill rotWithShape="1">
+          <a:blip r:embed="rId3"/>
+          <a:srcRect t="1713" r="36213" b="52027"/>
+          <a:stretch/>
+        </p:blipFill>
+        <p:spPr bwMode="auto">
+          <a:xfrm>
+            <a:off x="1652424" y="2348880"/>
+            <a:ext cx="5839152" cy="3548980"/>
+          </a:xfrm>
+          <a:prstGeom prst="rect">
+            <a:avLst/>
+          </a:prstGeom>
+          <a:ln>
+            <a:noFill/>
+          </a:ln>
+          <a:extLst>
+            <a:ext uri="{53640926-AAD7-44D8-BBD7-CCE9431645EC}">
+              <a14:shadowObscured xmlns:a14="http://schemas.microsoft.com/office/drawing/2010/main"/>
+            </a:ext>
+          </a:extLst>
+        </p:spPr>
+      </p:pic>
     </p:spTree>
     <p:extLst>
       <p:ext uri="{BB962C8B-B14F-4D97-AF65-F5344CB8AC3E}">
@@ -3845,7 +4118,7 @@
           <a:p>
             <a:r>
               <a:rPr lang="en-US" dirty="0"/>
-              <a:t>Task 2</a:t>
+              <a:t>Bar Chart</a:t>
             </a:r>
             <a:endParaRPr lang="pt-PT" dirty="0"/>
           </a:p>
@@ -3861,24 +4134,355 @@
             <p:ph idx="1"/>
           </p:nvPr>
         </p:nvSpPr>
-        <p:spPr/>
+        <p:spPr>
+          <a:xfrm>
+            <a:off x="107504" y="980728"/>
+            <a:ext cx="8507288" cy="5214974"/>
+          </a:xfrm>
+        </p:spPr>
         <p:txBody>
           <a:bodyPr>
             <a:noAutofit/>
           </a:bodyPr>
           <a:lstStyle/>
           <a:p>
+            <a:pPr lvl="0"/>
+            <a:r>
+              <a:rPr lang="en-GB" dirty="0"/>
+              <a:t>What organizations earned the most?</a:t>
+            </a:r>
+            <a:endParaRPr lang="en-US" dirty="0"/>
+          </a:p>
+          <a:p>
+            <a:pPr lvl="0"/>
+            <a:r>
+              <a:rPr lang="en-GB" dirty="0"/>
+              <a:t>What is the age at which players earn the most?</a:t>
+            </a:r>
+            <a:endParaRPr lang="en-US" dirty="0"/>
+          </a:p>
+          <a:p>
+            <a:pPr lvl="0"/>
+            <a:r>
+              <a:rPr lang="en-GB" dirty="0"/>
+              <a:t>What games have the most earnings?</a:t>
+            </a:r>
+            <a:endParaRPr lang="en-US" dirty="0"/>
+          </a:p>
+        </p:txBody>
+      </p:sp>
+      <p:pic>
+        <p:nvPicPr>
+          <p:cNvPr id="4" name="Imagem 3">
+            <a:extLst>
+              <a:ext uri="{FF2B5EF4-FFF2-40B4-BE49-F238E27FC236}">
+                <a16:creationId xmlns:a16="http://schemas.microsoft.com/office/drawing/2014/main" id="{E05F6433-2AB4-4E5A-961D-5A69967D99D8}"/>
+              </a:ext>
+            </a:extLst>
+          </p:cNvPr>
+          <p:cNvPicPr/>
+          <p:nvPr/>
+        </p:nvPicPr>
+        <p:blipFill rotWithShape="1">
+          <a:blip r:embed="rId3"/>
+          <a:srcRect l="35880" t="48487" r="706" b="4055"/>
+          <a:stretch/>
+        </p:blipFill>
+        <p:spPr bwMode="auto">
+          <a:xfrm>
+            <a:off x="447728" y="3776706"/>
+            <a:ext cx="3672930" cy="2100565"/>
+          </a:xfrm>
+          <a:prstGeom prst="rect">
+            <a:avLst/>
+          </a:prstGeom>
+          <a:ln>
+            <a:noFill/>
+          </a:ln>
+          <a:extLst>
+            <a:ext uri="{53640926-AAD7-44D8-BBD7-CCE9431645EC}">
+              <a14:shadowObscured xmlns:a14="http://schemas.microsoft.com/office/drawing/2010/main"/>
+            </a:ext>
+          </a:extLst>
+        </p:spPr>
+      </p:pic>
+      <p:pic>
+        <p:nvPicPr>
+          <p:cNvPr id="5" name="Imagem 4">
+            <a:extLst>
+              <a:ext uri="{FF2B5EF4-FFF2-40B4-BE49-F238E27FC236}">
+                <a16:creationId xmlns:a16="http://schemas.microsoft.com/office/drawing/2014/main" id="{35486A03-23F6-44D0-B0EC-865AE9B59A2D}"/>
+              </a:ext>
+            </a:extLst>
+          </p:cNvPr>
+          <p:cNvPicPr/>
+          <p:nvPr/>
+        </p:nvPicPr>
+        <p:blipFill rotWithShape="1">
+          <a:blip r:embed="rId4"/>
+          <a:srcRect l="35506" t="48829" r="1204" b="4226"/>
+          <a:stretch/>
+        </p:blipFill>
+        <p:spPr bwMode="auto">
+          <a:xfrm>
+            <a:off x="4911672" y="3798266"/>
+            <a:ext cx="3784600" cy="2040890"/>
+          </a:xfrm>
+          <a:prstGeom prst="rect">
+            <a:avLst/>
+          </a:prstGeom>
+          <a:ln>
+            <a:noFill/>
+          </a:ln>
+          <a:extLst>
+            <a:ext uri="{53640926-AAD7-44D8-BBD7-CCE9431645EC}">
+              <a14:shadowObscured xmlns:a14="http://schemas.microsoft.com/office/drawing/2010/main"/>
+            </a:ext>
+          </a:extLst>
+        </p:spPr>
+      </p:pic>
+    </p:spTree>
+    <p:extLst>
+      <p:ext uri="{BB962C8B-B14F-4D97-AF65-F5344CB8AC3E}">
+        <p14:creationId xmlns:p14="http://schemas.microsoft.com/office/powerpoint/2010/main" val="4153247797"/>
+      </p:ext>
+    </p:extLst>
+  </p:cSld>
+  <p:clrMapOvr>
+    <a:masterClrMapping/>
+  </p:clrMapOvr>
+</p:sld>
+</file>
+
+<file path=ppt/slides/slide12.xml><?xml version="1.0" encoding="utf-8"?>
+<p:sld xmlns:a="http://schemas.openxmlformats.org/drawingml/2006/main" xmlns:r="http://schemas.openxmlformats.org/officeDocument/2006/relationships" xmlns:p="http://schemas.openxmlformats.org/presentationml/2006/main">
+  <p:cSld>
+    <p:spTree>
+      <p:nvGrpSpPr>
+        <p:cNvPr id="1" name=""/>
+        <p:cNvGrpSpPr/>
+        <p:nvPr/>
+      </p:nvGrpSpPr>
+      <p:grpSpPr>
+        <a:xfrm>
+          <a:off x="0" y="0"/>
+          <a:ext cx="0" cy="0"/>
+          <a:chOff x="0" y="0"/>
+          <a:chExt cx="0" cy="0"/>
+        </a:xfrm>
+      </p:grpSpPr>
+      <p:sp>
+        <p:nvSpPr>
+          <p:cNvPr id="2" name="Title 1"/>
+          <p:cNvSpPr>
+            <a:spLocks noGrp="1"/>
+          </p:cNvSpPr>
+          <p:nvPr>
+            <p:ph type="title"/>
+          </p:nvPr>
+        </p:nvSpPr>
+        <p:spPr/>
+        <p:txBody>
+          <a:bodyPr/>
+          <a:lstStyle/>
+          <a:p>
             <a:r>
               <a:rPr lang="en-US" dirty="0"/>
-              <a:t>Selected Idiom and why it allows answering each question</a:t>
-            </a:r>
-          </a:p>
-        </p:txBody>
-      </p:sp>
+              <a:t>Scatter plot</a:t>
+            </a:r>
+            <a:endParaRPr lang="pt-PT" dirty="0"/>
+          </a:p>
+        </p:txBody>
+      </p:sp>
+      <p:sp>
+        <p:nvSpPr>
+          <p:cNvPr id="3" name="Content Placeholder 2"/>
+          <p:cNvSpPr>
+            <a:spLocks noGrp="1"/>
+          </p:cNvSpPr>
+          <p:nvPr>
+            <p:ph idx="1"/>
+          </p:nvPr>
+        </p:nvSpPr>
+        <p:spPr>
+          <a:xfrm>
+            <a:off x="107504" y="980728"/>
+            <a:ext cx="8928992" cy="5214974"/>
+          </a:xfrm>
+        </p:spPr>
+        <p:txBody>
+          <a:bodyPr>
+            <a:noAutofit/>
+          </a:bodyPr>
+          <a:lstStyle/>
+          <a:p>
+            <a:pPr lvl="0"/>
+            <a:r>
+              <a:rPr lang="en-GB" sz="2800" dirty="0"/>
+              <a:t>How does unemployment correlate with player earnings?</a:t>
+            </a:r>
+            <a:endParaRPr lang="en-US" sz="2800" dirty="0"/>
+          </a:p>
+        </p:txBody>
+      </p:sp>
+      <p:pic>
+        <p:nvPicPr>
+          <p:cNvPr id="5" name="Imagem 4">
+            <a:extLst>
+              <a:ext uri="{FF2B5EF4-FFF2-40B4-BE49-F238E27FC236}">
+                <a16:creationId xmlns:a16="http://schemas.microsoft.com/office/drawing/2014/main" id="{084EE821-A8AD-424D-AA1D-ED8A9160B220}"/>
+              </a:ext>
+            </a:extLst>
+          </p:cNvPr>
+          <p:cNvPicPr/>
+          <p:nvPr/>
+        </p:nvPicPr>
+        <p:blipFill rotWithShape="1">
+          <a:blip r:embed="rId3"/>
+          <a:srcRect t="49514" r="64493" b="2684"/>
+          <a:stretch/>
+        </p:blipFill>
+        <p:spPr bwMode="auto">
+          <a:xfrm>
+            <a:off x="2516891" y="2132856"/>
+            <a:ext cx="4110186" cy="3953188"/>
+          </a:xfrm>
+          <a:prstGeom prst="rect">
+            <a:avLst/>
+          </a:prstGeom>
+          <a:ln>
+            <a:noFill/>
+          </a:ln>
+          <a:extLst>
+            <a:ext uri="{53640926-AAD7-44D8-BBD7-CCE9431645EC}">
+              <a14:shadowObscured xmlns:a14="http://schemas.microsoft.com/office/drawing/2010/main"/>
+            </a:ext>
+          </a:extLst>
+        </p:spPr>
+      </p:pic>
     </p:spTree>
     <p:extLst>
       <p:ext uri="{BB962C8B-B14F-4D97-AF65-F5344CB8AC3E}">
         <p14:creationId xmlns:p14="http://schemas.microsoft.com/office/powerpoint/2010/main" val="346640620"/>
+      </p:ext>
+    </p:extLst>
+  </p:cSld>
+  <p:clrMapOvr>
+    <a:masterClrMapping/>
+  </p:clrMapOvr>
+</p:sld>
+</file>
+
+<file path=ppt/slides/slide13.xml><?xml version="1.0" encoding="utf-8"?>
+<p:sld xmlns:a="http://schemas.openxmlformats.org/drawingml/2006/main" xmlns:r="http://schemas.openxmlformats.org/officeDocument/2006/relationships" xmlns:p="http://schemas.openxmlformats.org/presentationml/2006/main">
+  <p:cSld>
+    <p:spTree>
+      <p:nvGrpSpPr>
+        <p:cNvPr id="1" name=""/>
+        <p:cNvGrpSpPr/>
+        <p:nvPr/>
+      </p:nvGrpSpPr>
+      <p:grpSpPr>
+        <a:xfrm>
+          <a:off x="0" y="0"/>
+          <a:ext cx="0" cy="0"/>
+          <a:chOff x="0" y="0"/>
+          <a:chExt cx="0" cy="0"/>
+        </a:xfrm>
+      </p:grpSpPr>
+      <p:sp>
+        <p:nvSpPr>
+          <p:cNvPr id="2" name="Title 1"/>
+          <p:cNvSpPr>
+            <a:spLocks noGrp="1"/>
+          </p:cNvSpPr>
+          <p:nvPr>
+            <p:ph type="title"/>
+          </p:nvPr>
+        </p:nvSpPr>
+        <p:spPr/>
+        <p:txBody>
+          <a:bodyPr/>
+          <a:lstStyle/>
+          <a:p>
+            <a:r>
+              <a:rPr lang="en-US" dirty="0"/>
+              <a:t>Heat Map</a:t>
+            </a:r>
+            <a:endParaRPr lang="pt-PT" dirty="0"/>
+          </a:p>
+        </p:txBody>
+      </p:sp>
+      <p:sp>
+        <p:nvSpPr>
+          <p:cNvPr id="3" name="Content Placeholder 2"/>
+          <p:cNvSpPr>
+            <a:spLocks noGrp="1"/>
+          </p:cNvSpPr>
+          <p:nvPr>
+            <p:ph idx="1"/>
+          </p:nvPr>
+        </p:nvSpPr>
+        <p:spPr>
+          <a:xfrm>
+            <a:off x="107504" y="980728"/>
+            <a:ext cx="8507288" cy="720080"/>
+          </a:xfrm>
+        </p:spPr>
+        <p:txBody>
+          <a:bodyPr>
+            <a:noAutofit/>
+          </a:bodyPr>
+          <a:lstStyle/>
+          <a:p>
+            <a:pPr lvl="0"/>
+            <a:r>
+              <a:rPr lang="en-GB" dirty="0"/>
+              <a:t>What months are the most active in esports?</a:t>
+            </a:r>
+            <a:endParaRPr lang="en-US" dirty="0"/>
+          </a:p>
+        </p:txBody>
+      </p:sp>
+      <p:pic>
+        <p:nvPicPr>
+          <p:cNvPr id="5" name="Imagem 4">
+            <a:extLst>
+              <a:ext uri="{FF2B5EF4-FFF2-40B4-BE49-F238E27FC236}">
+                <a16:creationId xmlns:a16="http://schemas.microsoft.com/office/drawing/2014/main" id="{2CD61F45-D724-4BDA-B5BD-8E179EA48574}"/>
+              </a:ext>
+            </a:extLst>
+          </p:cNvPr>
+          <p:cNvPicPr/>
+          <p:nvPr/>
+        </p:nvPicPr>
+        <p:blipFill rotWithShape="1">
+          <a:blip r:embed="rId3"/>
+          <a:srcRect l="64410" r="831" b="51513"/>
+          <a:stretch/>
+        </p:blipFill>
+        <p:spPr bwMode="auto">
+          <a:xfrm>
+            <a:off x="2173469" y="1988840"/>
+            <a:ext cx="4375358" cy="4030558"/>
+          </a:xfrm>
+          <a:prstGeom prst="rect">
+            <a:avLst/>
+          </a:prstGeom>
+          <a:ln>
+            <a:noFill/>
+          </a:ln>
+          <a:extLst>
+            <a:ext uri="{53640926-AAD7-44D8-BBD7-CCE9431645EC}">
+              <a14:shadowObscured xmlns:a14="http://schemas.microsoft.com/office/drawing/2010/main"/>
+            </a:ext>
+          </a:extLst>
+        </p:spPr>
+      </p:pic>
+    </p:spTree>
+    <p:extLst>
+      <p:ext uri="{BB962C8B-B14F-4D97-AF65-F5344CB8AC3E}">
+        <p14:creationId xmlns:p14="http://schemas.microsoft.com/office/powerpoint/2010/main" val="33785010"/>
       </p:ext>
     </p:extLst>
   </p:cSld>
@@ -4267,6 +4871,42 @@
           </a:p>
         </p:txBody>
       </p:sp>
+      <p:pic>
+        <p:nvPicPr>
+          <p:cNvPr id="6" name="Imagem 5">
+            <a:extLst>
+              <a:ext uri="{FF2B5EF4-FFF2-40B4-BE49-F238E27FC236}">
+                <a16:creationId xmlns:a16="http://schemas.microsoft.com/office/drawing/2014/main" id="{FE8FFE0A-CFFA-4761-B386-F1E4501DB353}"/>
+              </a:ext>
+            </a:extLst>
+          </p:cNvPr>
+          <p:cNvPicPr>
+            <a:picLocks noChangeAspect="1"/>
+          </p:cNvPicPr>
+          <p:nvPr/>
+        </p:nvPicPr>
+        <p:blipFill>
+          <a:blip r:embed="rId3" cstate="print">
+            <a:extLst>
+              <a:ext uri="{28A0092B-C50C-407E-A947-70E740481C1C}">
+                <a14:useLocalDpi xmlns:a14="http://schemas.microsoft.com/office/drawing/2010/main" val="0"/>
+              </a:ext>
+            </a:extLst>
+          </a:blip>
+          <a:stretch>
+            <a:fillRect/>
+          </a:stretch>
+        </p:blipFill>
+        <p:spPr>
+          <a:xfrm>
+            <a:off x="2105964" y="2924944"/>
+            <a:ext cx="4932040" cy="3586512"/>
+          </a:xfrm>
+          <a:prstGeom prst="rect">
+            <a:avLst/>
+          </a:prstGeom>
+        </p:spPr>
+      </p:pic>
     </p:spTree>
     <p:extLst>
       <p:ext uri="{BB962C8B-B14F-4D97-AF65-F5344CB8AC3E}">

</xml_diff>

<commit_message>
Fixed images and added names/numbers.
</commit_message>
<xml_diff>
--- a/docs/Checkpoint III - Presentation.pptx
+++ b/docs/Checkpoint III - Presentation.pptx
@@ -223,7 +223,7 @@
           <a:p>
             <a:fld id="{745C36E7-9E00-462E-80A3-32F2BE615C7A}" type="datetimeFigureOut">
               <a:rPr lang="en-US" smtClean="0"/>
-              <a:t>10/29/2018</a:t>
+              <a:t>10/30/2018</a:t>
             </a:fld>
             <a:endParaRPr lang="en-US"/>
           </a:p>
@@ -289,7 +289,7 @@
           <a:p>
             <a:fld id="{C7B702CB-D988-47C5-8204-95032A6A7C26}" type="slidenum">
               <a:rPr lang="en-US" smtClean="0"/>
-              <a:t>‹nº›</a:t>
+              <a:t>‹#›</a:t>
             </a:fld>
             <a:endParaRPr lang="en-US"/>
           </a:p>
@@ -389,7 +389,7 @@
             <a:fld id="{01F3E309-ED8D-4193-99AF-E5EA90965E98}" type="datetimeFigureOut">
               <a:rPr lang="en-US" smtClean="0"/>
               <a:pPr/>
-              <a:t>10/29/2018</a:t>
+              <a:t>10/30/2018</a:t>
             </a:fld>
             <a:endParaRPr lang="en-US"/>
           </a:p>
@@ -550,7 +550,7 @@
             <a:fld id="{F535F173-C1DD-4975-94BF-5B9ED67F7674}" type="slidenum">
               <a:rPr lang="en-US" smtClean="0"/>
               <a:pPr/>
-              <a:t>‹nº›</a:t>
+              <a:t>‹#›</a:t>
             </a:fld>
             <a:endParaRPr lang="en-US"/>
           </a:p>
@@ -1916,7 +1916,7 @@
             <a:fld id="{F3CC9924-33BC-4796-B0F9-D37DB5D899BF}" type="datetimeFigureOut">
               <a:rPr lang="pt-PT" smtClean="0"/>
               <a:pPr/>
-              <a:t>29/10/2018</a:t>
+              <a:t>30/10/2018</a:t>
             </a:fld>
             <a:endParaRPr lang="pt-PT"/>
           </a:p>
@@ -1975,7 +1975,7 @@
             <a:fld id="{B5EBF8D4-C87A-47B7-9996-84452461937B}" type="slidenum">
               <a:rPr lang="pt-PT" smtClean="0"/>
               <a:pPr/>
-              <a:t>‹nº›</a:t>
+              <a:t>‹#›</a:t>
             </a:fld>
             <a:endParaRPr lang="pt-PT"/>
           </a:p>
@@ -3693,7 +3693,7 @@
                   <a:schemeClr val="bg2"/>
                 </a:solidFill>
               </a:rPr>
-              <a:t>GX-A/T</a:t>
+              <a:t>G13-A</a:t>
             </a:r>
           </a:p>
         </p:txBody>
@@ -3709,7 +3709,7 @@
         <p:spPr>
           <a:xfrm>
             <a:off x="1979712" y="4571984"/>
-            <a:ext cx="2285984" cy="2286016"/>
+            <a:ext cx="2952328" cy="2286016"/>
           </a:xfrm>
           <a:prstGeom prst="rect">
             <a:avLst/>
@@ -3864,74 +3864,32 @@
           </a:lstStyle>
           <a:p>
             <a:r>
-              <a:rPr lang="pt-PT" sz="2400" b="0" dirty="0" err="1">
-                <a:solidFill>
-                  <a:schemeClr val="bg2"/>
-                </a:solidFill>
-              </a:rPr>
-              <a:t>Number</a:t>
-            </a:r>
-            <a:r>
               <a:rPr lang="pt-PT" sz="2400" b="0" dirty="0">
                 <a:solidFill>
                   <a:schemeClr val="bg2"/>
                 </a:solidFill>
               </a:rPr>
-              <a:t> – </a:t>
-            </a:r>
-            <a:r>
-              <a:rPr lang="pt-PT" sz="2400" b="0" dirty="0" err="1">
-                <a:solidFill>
-                  <a:schemeClr val="bg2"/>
-                </a:solidFill>
-              </a:rPr>
-              <a:t>Name</a:t>
-            </a:r>
-            <a:endParaRPr lang="pt-PT" sz="2400" b="0" dirty="0">
-              <a:solidFill>
-                <a:schemeClr val="bg2"/>
-              </a:solidFill>
-            </a:endParaRPr>
-          </a:p>
-          <a:p>
-            <a:r>
-              <a:rPr lang="pt-PT" sz="2400" b="0" dirty="0" err="1">
-                <a:solidFill>
-                  <a:schemeClr val="bg2"/>
-                </a:solidFill>
-              </a:rPr>
-              <a:t>Number</a:t>
-            </a:r>
+              <a:t>83463 – Francisco Campaniço</a:t>
+            </a:r>
+          </a:p>
+          <a:p>
             <a:r>
               <a:rPr lang="pt-PT" sz="2400" b="0" dirty="0">
                 <a:solidFill>
                   <a:schemeClr val="bg2"/>
                 </a:solidFill>
               </a:rPr>
-              <a:t> – </a:t>
-            </a:r>
-            <a:r>
-              <a:rPr lang="pt-PT" sz="2400" b="0" dirty="0" err="1">
+              <a:t>83482 – João Rafael</a:t>
+            </a:r>
+          </a:p>
+          <a:p>
+            <a:r>
+              <a:rPr lang="pt-PT" sz="2400" b="0">
                 <a:solidFill>
                   <a:schemeClr val="bg2"/>
                 </a:solidFill>
               </a:rPr>
-              <a:t>Name</a:t>
-            </a:r>
-            <a:endParaRPr lang="pt-PT" sz="2400" b="0" dirty="0">
-              <a:solidFill>
-                <a:schemeClr val="bg2"/>
-              </a:solidFill>
-            </a:endParaRPr>
-          </a:p>
-          <a:p>
-            <a:r>
-              <a:rPr lang="pt-PT" sz="2400" b="0" dirty="0" err="1">
-                <a:solidFill>
-                  <a:schemeClr val="bg2"/>
-                </a:solidFill>
-              </a:rPr>
-              <a:t>Number</a:t>
+              <a:t>83558 </a:t>
             </a:r>
             <a:r>
               <a:rPr lang="pt-PT" sz="2400" b="0" dirty="0">
@@ -3939,21 +3897,8 @@
                   <a:schemeClr val="bg2"/>
                 </a:solidFill>
               </a:rPr>
-              <a:t> – </a:t>
-            </a:r>
-            <a:r>
-              <a:rPr lang="pt-PT" sz="2400" b="0" dirty="0" err="1">
-                <a:solidFill>
-                  <a:schemeClr val="bg2"/>
-                </a:solidFill>
-              </a:rPr>
-              <a:t>Name</a:t>
-            </a:r>
-            <a:endParaRPr lang="pt-PT" sz="2400" b="0" dirty="0">
-              <a:solidFill>
-                <a:schemeClr val="bg2"/>
-              </a:solidFill>
-            </a:endParaRPr>
+              <a:t>– Rodrigo Oliveira</a:t>
+            </a:r>
           </a:p>
         </p:txBody>
       </p:sp>
@@ -4173,41 +4118,6 @@
       </p:sp>
       <p:pic>
         <p:nvPicPr>
-          <p:cNvPr id="4" name="Imagem 3">
-            <a:extLst>
-              <a:ext uri="{FF2B5EF4-FFF2-40B4-BE49-F238E27FC236}">
-                <a16:creationId xmlns:a16="http://schemas.microsoft.com/office/drawing/2014/main" id="{E05F6433-2AB4-4E5A-961D-5A69967D99D8}"/>
-              </a:ext>
-            </a:extLst>
-          </p:cNvPr>
-          <p:cNvPicPr/>
-          <p:nvPr/>
-        </p:nvPicPr>
-        <p:blipFill rotWithShape="1">
-          <a:blip r:embed="rId3"/>
-          <a:srcRect l="35880" t="48487" r="706" b="4055"/>
-          <a:stretch/>
-        </p:blipFill>
-        <p:spPr bwMode="auto">
-          <a:xfrm>
-            <a:off x="447728" y="3776706"/>
-            <a:ext cx="3672930" cy="2100565"/>
-          </a:xfrm>
-          <a:prstGeom prst="rect">
-            <a:avLst/>
-          </a:prstGeom>
-          <a:ln>
-            <a:noFill/>
-          </a:ln>
-          <a:extLst>
-            <a:ext uri="{53640926-AAD7-44D8-BBD7-CCE9431645EC}">
-              <a14:shadowObscured xmlns:a14="http://schemas.microsoft.com/office/drawing/2010/main"/>
-            </a:ext>
-          </a:extLst>
-        </p:spPr>
-      </p:pic>
-      <p:pic>
-        <p:nvPicPr>
           <p:cNvPr id="5" name="Imagem 4">
             <a:extLst>
               <a:ext uri="{FF2B5EF4-FFF2-40B4-BE49-F238E27FC236}">
@@ -4219,7 +4129,7 @@
           <p:nvPr/>
         </p:nvPicPr>
         <p:blipFill rotWithShape="1">
-          <a:blip r:embed="rId4"/>
+          <a:blip r:embed="rId3"/>
           <a:srcRect l="35506" t="48829" r="1204" b="4226"/>
           <a:stretch/>
         </p:blipFill>
@@ -4239,6 +4149,36 @@
               <a14:shadowObscured xmlns:a14="http://schemas.microsoft.com/office/drawing/2010/main"/>
             </a:ext>
           </a:extLst>
+        </p:spPr>
+      </p:pic>
+      <p:pic>
+        <p:nvPicPr>
+          <p:cNvPr id="6" name="Picture 5">
+            <a:extLst>
+              <a:ext uri="{FF2B5EF4-FFF2-40B4-BE49-F238E27FC236}">
+                <a16:creationId xmlns:a16="http://schemas.microsoft.com/office/drawing/2014/main" id="{98E0F7DA-D901-4261-9ECA-AF669043E71C}"/>
+              </a:ext>
+            </a:extLst>
+          </p:cNvPr>
+          <p:cNvPicPr>
+            <a:picLocks noChangeAspect="1"/>
+          </p:cNvPicPr>
+          <p:nvPr/>
+        </p:nvPicPr>
+        <p:blipFill>
+          <a:blip r:embed="rId4"/>
+          <a:stretch>
+            <a:fillRect/>
+          </a:stretch>
+        </p:blipFill>
+        <p:spPr>
+          <a:xfrm>
+            <a:off x="529208" y="3810914"/>
+            <a:ext cx="3837131" cy="2040890"/>
+          </a:xfrm>
+          <a:prstGeom prst="rect">
+            <a:avLst/>
+          </a:prstGeom>
         </p:spPr>
       </p:pic>
     </p:spTree>

</xml_diff>

<commit_message>
little change to img
</commit_message>
<xml_diff>
--- a/docs/Checkpoint III - Presentation.pptx
+++ b/docs/Checkpoint III - Presentation.pptx
@@ -289,7 +289,7 @@
           <a:p>
             <a:fld id="{C7B702CB-D988-47C5-8204-95032A6A7C26}" type="slidenum">
               <a:rPr lang="en-US" smtClean="0"/>
-              <a:t>‹#›</a:t>
+              <a:t>‹nº›</a:t>
             </a:fld>
             <a:endParaRPr lang="en-US"/>
           </a:p>
@@ -550,7 +550,7 @@
             <a:fld id="{F535F173-C1DD-4975-94BF-5B9ED67F7674}" type="slidenum">
               <a:rPr lang="en-US" smtClean="0"/>
               <a:pPr/>
-              <a:t>‹#›</a:t>
+              <a:t>‹nº›</a:t>
             </a:fld>
             <a:endParaRPr lang="en-US"/>
           </a:p>
@@ -1975,7 +1975,7 @@
             <a:fld id="{B5EBF8D4-C87A-47B7-9996-84452461937B}" type="slidenum">
               <a:rPr lang="pt-PT" smtClean="0"/>
               <a:pPr/>
-              <a:t>‹#›</a:t>
+              <a:t>‹nº›</a:t>
             </a:fld>
             <a:endParaRPr lang="pt-PT"/>
           </a:p>
@@ -4591,7 +4591,7 @@
         </p:nvSpPr>
         <p:spPr>
           <a:xfrm>
-            <a:off x="457200" y="1285860"/>
+            <a:off x="467544" y="925820"/>
             <a:ext cx="2674640" cy="1423060"/>
           </a:xfrm>
         </p:spPr>
@@ -4644,7 +4644,7 @@
         </p:nvSpPr>
         <p:spPr>
           <a:xfrm>
-            <a:off x="5508104" y="1285860"/>
+            <a:off x="5508104" y="925820"/>
             <a:ext cx="2880320" cy="1063020"/>
           </a:xfrm>
           <a:prstGeom prst="rect">
@@ -4813,10 +4813,10 @@
       </p:sp>
       <p:pic>
         <p:nvPicPr>
-          <p:cNvPr id="6" name="Imagem 5">
+          <p:cNvPr id="7" name="Imagem 6">
             <a:extLst>
               <a:ext uri="{FF2B5EF4-FFF2-40B4-BE49-F238E27FC236}">
-                <a16:creationId xmlns:a16="http://schemas.microsoft.com/office/drawing/2014/main" id="{FE8FFE0A-CFFA-4761-B386-F1E4501DB353}"/>
+                <a16:creationId xmlns:a16="http://schemas.microsoft.com/office/drawing/2014/main" id="{890DDFDA-1727-41E3-99BC-08B3DF639B2B}"/>
               </a:ext>
             </a:extLst>
           </p:cNvPr>
@@ -4839,8 +4839,8 @@
         </p:blipFill>
         <p:spPr>
           <a:xfrm>
-            <a:off x="2105964" y="2924944"/>
-            <a:ext cx="4932040" cy="3586512"/>
+            <a:off x="323512" y="2204865"/>
+            <a:ext cx="8496944" cy="4627684"/>
           </a:xfrm>
           <a:prstGeom prst="rect">
             <a:avLst/>

</xml_diff>